<commit_message>
Course project done :+1:
</commit_message>
<xml_diff>
--- a/3rd-Grade/Sixth-Semester/Course-Project/docs/Московка_АА_Презентация.pptx
+++ b/3rd-Grade/Sixth-Semester/Course-Project/docs/Московка_АА_Презентация.pptx
@@ -8,15 +8,14 @@
     <p:sldId id="256" r:id="rId2"/>
     <p:sldId id="258" r:id="rId3"/>
     <p:sldId id="261" r:id="rId4"/>
-    <p:sldId id="263" r:id="rId5"/>
+    <p:sldId id="267" r:id="rId5"/>
     <p:sldId id="266" r:id="rId6"/>
-    <p:sldId id="267" r:id="rId7"/>
-    <p:sldId id="269" r:id="rId8"/>
-    <p:sldId id="268" r:id="rId9"/>
-    <p:sldId id="270" r:id="rId10"/>
-    <p:sldId id="272" r:id="rId11"/>
-    <p:sldId id="259" r:id="rId12"/>
-    <p:sldId id="273" r:id="rId13"/>
+    <p:sldId id="269" r:id="rId7"/>
+    <p:sldId id="268" r:id="rId8"/>
+    <p:sldId id="270" r:id="rId9"/>
+    <p:sldId id="272" r:id="rId10"/>
+    <p:sldId id="259" r:id="rId11"/>
+    <p:sldId id="273" r:id="rId12"/>
   </p:sldIdLst>
   <p:sldSz cx="12192000" cy="6858000"/>
   <p:notesSz cx="6858000" cy="9144000"/>
@@ -349,7 +348,7 @@
           <a:p>
             <a:fld id="{48A87A34-81AB-432B-8DAE-1953F412C126}" type="datetimeFigureOut">
               <a:rPr lang="en-US" smtClean="0"/>
-              <a:t>12/26/2021</a:t>
+              <a:t>5/10/2022</a:t>
             </a:fld>
             <a:endParaRPr lang="en-US" dirty="0"/>
           </a:p>
@@ -557,7 +556,7 @@
           <a:p>
             <a:fld id="{48A87A34-81AB-432B-8DAE-1953F412C126}" type="datetimeFigureOut">
               <a:rPr lang="en-US" smtClean="0"/>
-              <a:t>12/26/2021</a:t>
+              <a:t>5/10/2022</a:t>
             </a:fld>
             <a:endParaRPr lang="en-US" dirty="0"/>
           </a:p>
@@ -813,7 +812,7 @@
           <a:p>
             <a:fld id="{48A87A34-81AB-432B-8DAE-1953F412C126}" type="datetimeFigureOut">
               <a:rPr lang="en-US" smtClean="0"/>
-              <a:t>12/26/2021</a:t>
+              <a:t>5/10/2022</a:t>
             </a:fld>
             <a:endParaRPr lang="en-US" dirty="0"/>
           </a:p>
@@ -987,7 +986,7 @@
           <a:p>
             <a:fld id="{48A87A34-81AB-432B-8DAE-1953F412C126}" type="datetimeFigureOut">
               <a:rPr lang="en-US" smtClean="0"/>
-              <a:t>12/26/2021</a:t>
+              <a:t>5/10/2022</a:t>
             </a:fld>
             <a:endParaRPr lang="en-US" dirty="0"/>
           </a:p>
@@ -1330,7 +1329,7 @@
           <a:p>
             <a:fld id="{48A87A34-81AB-432B-8DAE-1953F412C126}" type="datetimeFigureOut">
               <a:rPr lang="en-US" smtClean="0"/>
-              <a:t>12/26/2021</a:t>
+              <a:t>5/10/2022</a:t>
             </a:fld>
             <a:endParaRPr lang="en-US" dirty="0"/>
           </a:p>
@@ -1605,7 +1604,7 @@
           <a:p>
             <a:fld id="{48A87A34-81AB-432B-8DAE-1953F412C126}" type="datetimeFigureOut">
               <a:rPr lang="en-US" smtClean="0"/>
-              <a:t>12/26/2021</a:t>
+              <a:t>5/10/2022</a:t>
             </a:fld>
             <a:endParaRPr lang="en-US" dirty="0"/>
           </a:p>
@@ -1984,7 +1983,7 @@
           <a:p>
             <a:fld id="{48A87A34-81AB-432B-8DAE-1953F412C126}" type="datetimeFigureOut">
               <a:rPr lang="en-US" smtClean="0"/>
-              <a:t>12/26/2021</a:t>
+              <a:t>5/10/2022</a:t>
             </a:fld>
             <a:endParaRPr lang="en-US" dirty="0"/>
           </a:p>
@@ -2102,7 +2101,7 @@
           <a:p>
             <a:fld id="{48A87A34-81AB-432B-8DAE-1953F412C126}" type="datetimeFigureOut">
               <a:rPr lang="en-US" smtClean="0"/>
-              <a:t>12/26/2021</a:t>
+              <a:t>5/10/2022</a:t>
             </a:fld>
             <a:endParaRPr lang="en-US" dirty="0"/>
           </a:p>
@@ -2273,7 +2272,7 @@
           <a:p>
             <a:fld id="{48A87A34-81AB-432B-8DAE-1953F412C126}" type="datetimeFigureOut">
               <a:rPr lang="en-US" smtClean="0"/>
-              <a:t>12/26/2021</a:t>
+              <a:t>5/10/2022</a:t>
             </a:fld>
             <a:endParaRPr lang="en-US" dirty="0"/>
           </a:p>
@@ -2627,7 +2626,7 @@
           <a:p>
             <a:fld id="{48A87A34-81AB-432B-8DAE-1953F412C126}" type="datetimeFigureOut">
               <a:rPr lang="en-US" smtClean="0"/>
-              <a:t>12/26/2021</a:t>
+              <a:t>5/10/2022</a:t>
             </a:fld>
             <a:endParaRPr lang="en-US" dirty="0"/>
           </a:p>
@@ -3009,7 +3008,7 @@
           <a:p>
             <a:fld id="{48A87A34-81AB-432B-8DAE-1953F412C126}" type="datetimeFigureOut">
               <a:rPr lang="en-US" smtClean="0"/>
-              <a:t>12/26/2021</a:t>
+              <a:t>5/10/2022</a:t>
             </a:fld>
             <a:endParaRPr lang="en-US" dirty="0"/>
           </a:p>
@@ -3297,7 +3296,7 @@
             <a:fld id="{48A87A34-81AB-432B-8DAE-1953F412C126}" type="datetimeFigureOut">
               <a:rPr lang="en-US" smtClean="0"/>
               <a:pPr/>
-              <a:t>12/26/2021</a:t>
+              <a:t>5/10/2022</a:t>
             </a:fld>
             <a:endParaRPr lang="en-US" dirty="0"/>
           </a:p>
@@ -3886,7 +3885,7 @@
         </p:spPr>
         <p:txBody>
           <a:bodyPr>
-            <a:normAutofit/>
+            <a:normAutofit fontScale="62500" lnSpcReduction="20000"/>
           </a:bodyPr>
           <a:lstStyle/>
           <a:p>
@@ -3897,7 +3896,7 @@
                   <a:schemeClr val="tx1"/>
                 </a:solidFill>
               </a:rPr>
-              <a:t>Тема: Веб-приложение </a:t>
+              <a:t>Тема: разработка и развертывание в облачном сервисе клиент-серверного </a:t>
             </a:r>
             <a:r>
               <a:rPr lang="ru-RU" dirty="0" err="1">
@@ -3905,7 +3904,7 @@
                   <a:schemeClr val="tx1"/>
                 </a:solidFill>
               </a:rPr>
-              <a:t>версионного</a:t>
+              <a:t>фуллстек</a:t>
             </a:r>
             <a:r>
               <a:rPr lang="ru-RU" dirty="0">
@@ -3913,7 +3912,7 @@
                   <a:schemeClr val="tx1"/>
                 </a:solidFill>
               </a:rPr>
-              <a:t> контроля</a:t>
+              <a:t>-приложения для контроля выдачи книг в библиотеке</a:t>
             </a:r>
             <a:endParaRPr lang="en-US" dirty="0">
               <a:solidFill>
@@ -4152,9 +4151,12 @@
             <a:pPr algn="ctr"/>
             <a:r>
               <a:rPr lang="ru-RU" dirty="0"/>
-              <a:t>МИРЭА, 2021</a:t>
-            </a:r>
-            <a:endParaRPr lang="en-US" dirty="0"/>
+              <a:t>МИРЭА, 202</a:t>
+            </a:r>
+            <a:r>
+              <a:rPr lang="en-US" dirty="0"/>
+              <a:t>2</a:t>
+            </a:r>
           </a:p>
         </p:txBody>
       </p:sp>
@@ -4202,123 +4204,111 @@
       </p:grpSpPr>
       <p:sp>
         <p:nvSpPr>
-          <p:cNvPr id="3" name="Прямоугольник 2">
+          <p:cNvPr id="3" name="TextBox 2">
             <a:extLst>
               <a:ext uri="{FF2B5EF4-FFF2-40B4-BE49-F238E27FC236}">
-                <a16:creationId xmlns:a16="http://schemas.microsoft.com/office/drawing/2014/main" id="{49AA2B79-CD4D-4D53-8055-35A7B6E2A1B4}"/>
+                <a16:creationId xmlns:a16="http://schemas.microsoft.com/office/drawing/2014/main" id="{F3782691-7F38-454E-8DAB-BC6A0E613DF0}"/>
               </a:ext>
             </a:extLst>
           </p:cNvPr>
-          <p:cNvSpPr/>
+          <p:cNvSpPr txBox="1"/>
           <p:nvPr/>
         </p:nvSpPr>
         <p:spPr>
           <a:xfrm>
-            <a:off x="2289132" y="262452"/>
-            <a:ext cx="7613735" cy="1071048"/>
+            <a:off x="2061352" y="159080"/>
+            <a:ext cx="8069296" cy="584775"/>
           </a:xfrm>
           <a:prstGeom prst="rect">
             <a:avLst/>
           </a:prstGeom>
-        </p:spPr>
-        <p:txBody>
-          <a:bodyPr wrap="square">
+          <a:noFill/>
+        </p:spPr>
+        <p:txBody>
+          <a:bodyPr wrap="square" rtlCol="0">
             <a:spAutoFit/>
           </a:bodyPr>
           <a:lstStyle/>
           <a:p>
             <a:pPr algn="ctr"/>
             <a:r>
-              <a:rPr lang="en-US" sz="3200" dirty="0" err="1"/>
-              <a:t>Скриншот</a:t>
-            </a:r>
-            <a:r>
-              <a:rPr lang="en-US" sz="3200" dirty="0"/>
-              <a:t> </a:t>
-            </a:r>
-            <a:r>
-              <a:rPr lang="en-US" sz="3200" dirty="0" err="1"/>
-              <a:t>успешной</a:t>
-            </a:r>
-            <a:r>
-              <a:rPr lang="en-US" sz="3200" dirty="0"/>
-              <a:t> </a:t>
-            </a:r>
-            <a:r>
-              <a:rPr lang="en-US" sz="3200" dirty="0" err="1"/>
-              <a:t>проверки</a:t>
-            </a:r>
-            <a:r>
-              <a:rPr lang="en-US" sz="3200" dirty="0"/>
-              <a:t> </a:t>
-            </a:r>
-            <a:r>
-              <a:rPr lang="en-US" sz="3200" dirty="0" err="1"/>
-              <a:t>запроса</a:t>
-            </a:r>
-            <a:r>
-              <a:rPr lang="en-US" sz="3200" dirty="0"/>
-              <a:t> на </a:t>
-            </a:r>
-            <a:r>
-              <a:rPr lang="en-US" sz="3200" dirty="0" err="1"/>
-              <a:t>регистрацию</a:t>
-            </a:r>
-            <a:endParaRPr lang="en-US" sz="4800" dirty="0"/>
+              <a:rPr lang="ru-RU" sz="3200" dirty="0"/>
+              <a:t>Формы выдачи и возврата книги</a:t>
+            </a:r>
+            <a:endParaRPr lang="en-US" sz="3200" dirty="0"/>
           </a:p>
         </p:txBody>
       </p:sp>
       <p:pic>
         <p:nvPicPr>
-          <p:cNvPr id="5122" name="Picture 2" descr="https://cdn.discordapp.com/attachments/912348055511113748/912359789353373757/unknown.png">
+          <p:cNvPr id="4" name="Рисунок 3">
             <a:extLst>
               <a:ext uri="{FF2B5EF4-FFF2-40B4-BE49-F238E27FC236}">
-                <a16:creationId xmlns:a16="http://schemas.microsoft.com/office/drawing/2014/main" id="{9ED5D2E4-152B-417C-962C-7D94ABC31E7F}"/>
+                <a16:creationId xmlns:a16="http://schemas.microsoft.com/office/drawing/2014/main" id="{17AB259E-F78F-4E64-87D2-E114FF126868}"/>
               </a:ext>
             </a:extLst>
           </p:cNvPr>
-          <p:cNvPicPr>
-            <a:picLocks noChangeAspect="1" noChangeArrowheads="1"/>
-          </p:cNvPicPr>
+          <p:cNvPicPr/>
           <p:nvPr/>
         </p:nvPicPr>
         <p:blipFill>
-          <a:blip r:embed="rId2">
-            <a:extLst>
-              <a:ext uri="{28A0092B-C50C-407E-A947-70E740481C1C}">
-                <a14:useLocalDpi xmlns:a14="http://schemas.microsoft.com/office/drawing/2010/main" val="0"/>
-              </a:ext>
-            </a:extLst>
-          </a:blip>
-          <a:srcRect/>
+          <a:blip r:embed="rId2"/>
           <a:stretch>
             <a:fillRect/>
           </a:stretch>
         </p:blipFill>
-        <p:spPr bwMode="auto">
-          <a:xfrm>
-            <a:off x="438150" y="2079164"/>
-            <a:ext cx="11315700" cy="3048461"/>
+        <p:spPr>
+          <a:xfrm>
+            <a:off x="773740" y="2463993"/>
+            <a:ext cx="4833703" cy="2137570"/>
           </a:xfrm>
           <a:prstGeom prst="rect">
             <a:avLst/>
           </a:prstGeom>
-          <a:noFill/>
-          <a:extLst>
-            <a:ext uri="{909E8E84-426E-40DD-AFC4-6F175D3DCCD1}">
-              <a14:hiddenFill xmlns:a14="http://schemas.microsoft.com/office/drawing/2010/main">
-                <a:solidFill>
-                  <a:srgbClr val="FFFFFF"/>
-                </a:solidFill>
-              </a14:hiddenFill>
-            </a:ext>
-          </a:extLst>
+          <a:ln>
+            <a:solidFill>
+              <a:schemeClr val="tx1"/>
+            </a:solidFill>
+          </a:ln>
+        </p:spPr>
+      </p:pic>
+      <p:pic>
+        <p:nvPicPr>
+          <p:cNvPr id="5" name="Рисунок 4">
+            <a:extLst>
+              <a:ext uri="{FF2B5EF4-FFF2-40B4-BE49-F238E27FC236}">
+                <a16:creationId xmlns:a16="http://schemas.microsoft.com/office/drawing/2014/main" id="{F37F1D4D-8E7A-4DD8-8544-19D3EAD269D3}"/>
+              </a:ext>
+            </a:extLst>
+          </p:cNvPr>
+          <p:cNvPicPr/>
+          <p:nvPr/>
+        </p:nvPicPr>
+        <p:blipFill>
+          <a:blip r:embed="rId3"/>
+          <a:stretch>
+            <a:fillRect/>
+          </a:stretch>
+        </p:blipFill>
+        <p:spPr>
+          <a:xfrm>
+            <a:off x="6369550" y="2463991"/>
+            <a:ext cx="5073513" cy="2137571"/>
+          </a:xfrm>
+          <a:prstGeom prst="rect">
+            <a:avLst/>
+          </a:prstGeom>
+          <a:ln>
+            <a:solidFill>
+              <a:schemeClr val="tx1"/>
+            </a:solidFill>
+          </a:ln>
         </p:spPr>
       </p:pic>
     </p:spTree>
     <p:extLst>
       <p:ext uri="{BB962C8B-B14F-4D97-AF65-F5344CB8AC3E}">
-        <p14:creationId xmlns:p14="http://schemas.microsoft.com/office/powerpoint/2010/main" val="2690175273"/>
+        <p14:creationId xmlns:p14="http://schemas.microsoft.com/office/powerpoint/2010/main" val="504610937"/>
       </p:ext>
     </p:extLst>
   </p:cSld>
@@ -4371,8 +4361,8 @@
         </p:nvSpPr>
         <p:spPr>
           <a:xfrm>
-            <a:off x="2061352" y="159080"/>
-            <a:ext cx="8069296" cy="1077218"/>
+            <a:off x="1073230" y="38100"/>
+            <a:ext cx="9902665" cy="584775"/>
           </a:xfrm>
           <a:prstGeom prst="rect">
             <a:avLst/>
@@ -4387,208 +4377,44 @@
           <a:p>
             <a:pPr algn="ctr"/>
             <a:r>
-              <a:rPr lang="en-US" sz="3200" dirty="0" err="1"/>
-              <a:t>Скриншот</a:t>
-            </a:r>
-            <a:r>
-              <a:rPr lang="en-US" sz="3200" dirty="0"/>
-              <a:t> </a:t>
-            </a:r>
-            <a:r>
-              <a:rPr lang="en-US" sz="3200" dirty="0" err="1"/>
-              <a:t>успешной</a:t>
-            </a:r>
-            <a:r>
-              <a:rPr lang="en-US" sz="3200" dirty="0"/>
-              <a:t> </a:t>
-            </a:r>
-            <a:r>
-              <a:rPr lang="en-US" sz="3200" dirty="0" err="1"/>
-              <a:t>проверки</a:t>
-            </a:r>
-            <a:r>
               <a:rPr lang="ru-RU" sz="3200" dirty="0"/>
-              <a:t> наличия пользователя в системе</a:t>
-            </a:r>
-            <a:endParaRPr lang="en-US" sz="3200" dirty="0"/>
+              <a:t>Форма для удаления книг</a:t>
+            </a:r>
+            <a:endParaRPr lang="en-US" sz="4000" dirty="0"/>
           </a:p>
         </p:txBody>
       </p:sp>
       <p:pic>
         <p:nvPicPr>
-          <p:cNvPr id="6146" name="Picture 2" descr="https://cdn.discordapp.com/attachments/912348055511113748/912362950570954763/unknown.png">
+          <p:cNvPr id="4" name="Рисунок 3">
             <a:extLst>
               <a:ext uri="{FF2B5EF4-FFF2-40B4-BE49-F238E27FC236}">
-                <a16:creationId xmlns:a16="http://schemas.microsoft.com/office/drawing/2014/main" id="{4BE9AEC2-E371-40E2-8B1D-0F41C7CB8474}"/>
+                <a16:creationId xmlns:a16="http://schemas.microsoft.com/office/drawing/2014/main" id="{6DAD5E18-78F7-42C3-A7DB-39ED4ED98DC3}"/>
               </a:ext>
             </a:extLst>
           </p:cNvPr>
-          <p:cNvPicPr>
-            <a:picLocks noChangeAspect="1" noChangeArrowheads="1"/>
-          </p:cNvPicPr>
+          <p:cNvPicPr/>
           <p:nvPr/>
         </p:nvPicPr>
         <p:blipFill>
-          <a:blip r:embed="rId2">
-            <a:extLst>
-              <a:ext uri="{28A0092B-C50C-407E-A947-70E740481C1C}">
-                <a14:useLocalDpi xmlns:a14="http://schemas.microsoft.com/office/drawing/2010/main" val="0"/>
-              </a:ext>
-            </a:extLst>
-          </a:blip>
-          <a:srcRect/>
+          <a:blip r:embed="rId2"/>
           <a:stretch>
             <a:fillRect/>
           </a:stretch>
         </p:blipFill>
-        <p:spPr bwMode="auto">
-          <a:xfrm>
-            <a:off x="969637" y="1236298"/>
-            <a:ext cx="10252725" cy="5051603"/>
+        <p:spPr>
+          <a:xfrm>
+            <a:off x="2275995" y="2709386"/>
+            <a:ext cx="7640009" cy="1439227"/>
           </a:xfrm>
           <a:prstGeom prst="rect">
             <a:avLst/>
           </a:prstGeom>
-          <a:noFill/>
-          <a:extLst>
-            <a:ext uri="{909E8E84-426E-40DD-AFC4-6F175D3DCCD1}">
-              <a14:hiddenFill xmlns:a14="http://schemas.microsoft.com/office/drawing/2010/main">
-                <a:solidFill>
-                  <a:srgbClr val="FFFFFF"/>
-                </a:solidFill>
-              </a14:hiddenFill>
-            </a:ext>
-          </a:extLst>
-        </p:spPr>
-      </p:pic>
-    </p:spTree>
-    <p:extLst>
-      <p:ext uri="{BB962C8B-B14F-4D97-AF65-F5344CB8AC3E}">
-        <p14:creationId xmlns:p14="http://schemas.microsoft.com/office/powerpoint/2010/main" val="504610937"/>
-      </p:ext>
-    </p:extLst>
-  </p:cSld>
-  <p:clrMapOvr>
-    <a:masterClrMapping/>
-  </p:clrMapOvr>
-  <mc:AlternateContent xmlns:mc="http://schemas.openxmlformats.org/markup-compatibility/2006" xmlns:p14="http://schemas.microsoft.com/office/powerpoint/2010/main">
-    <mc:Choice Requires="p14">
-      <p:transition spd="slow" p14:dur="1300">
-        <p14:pan dir="u"/>
-      </p:transition>
-    </mc:Choice>
-    <mc:Fallback xmlns="">
-      <p:transition spd="slow">
-        <p:fade/>
-      </p:transition>
-    </mc:Fallback>
-  </mc:AlternateContent>
-</p:sld>
-</file>
-
-<file path=ppt/slides/slide12.xml><?xml version="1.0" encoding="utf-8"?>
-<p:sld xmlns:a="http://schemas.openxmlformats.org/drawingml/2006/main" xmlns:r="http://schemas.openxmlformats.org/officeDocument/2006/relationships" xmlns:p="http://schemas.openxmlformats.org/presentationml/2006/main">
-  <p:cSld>
-    <p:spTree>
-      <p:nvGrpSpPr>
-        <p:cNvPr id="1" name=""/>
-        <p:cNvGrpSpPr/>
-        <p:nvPr/>
-      </p:nvGrpSpPr>
-      <p:grpSpPr>
-        <a:xfrm>
-          <a:off x="0" y="0"/>
-          <a:ext cx="0" cy="0"/>
-          <a:chOff x="0" y="0"/>
-          <a:chExt cx="0" cy="0"/>
-        </a:xfrm>
-      </p:grpSpPr>
-      <p:sp>
-        <p:nvSpPr>
-          <p:cNvPr id="3" name="TextBox 2">
-            <a:extLst>
-              <a:ext uri="{FF2B5EF4-FFF2-40B4-BE49-F238E27FC236}">
-                <a16:creationId xmlns:a16="http://schemas.microsoft.com/office/drawing/2014/main" id="{F3782691-7F38-454E-8DAB-BC6A0E613DF0}"/>
-              </a:ext>
-            </a:extLst>
-          </p:cNvPr>
-          <p:cNvSpPr txBox="1"/>
-          <p:nvPr/>
-        </p:nvSpPr>
-        <p:spPr>
-          <a:xfrm>
-            <a:off x="1073230" y="38100"/>
-            <a:ext cx="9902665" cy="1077218"/>
-          </a:xfrm>
-          <a:prstGeom prst="rect">
-            <a:avLst/>
-          </a:prstGeom>
-          <a:noFill/>
-        </p:spPr>
-        <p:txBody>
-          <a:bodyPr wrap="square" rtlCol="0">
-            <a:spAutoFit/>
-          </a:bodyPr>
-          <a:lstStyle/>
-          <a:p>
-            <a:pPr algn="ctr"/>
-            <a:r>
-              <a:rPr lang="en-US" sz="3200" dirty="0" err="1"/>
-              <a:t>Скриншот</a:t>
-            </a:r>
-            <a:r>
-              <a:rPr lang="ru-RU" sz="3200" dirty="0"/>
-              <a:t> отправки запроса на получение списка пользователей в системе</a:t>
-            </a:r>
-            <a:endParaRPr lang="en-US" sz="4000" dirty="0"/>
-          </a:p>
-        </p:txBody>
-      </p:sp>
-      <p:pic>
-        <p:nvPicPr>
-          <p:cNvPr id="7170" name="Picture 2" descr="https://cdn.discordapp.com/attachments/912348055511113748/912363455334457354/unknown.png">
-            <a:extLst>
-              <a:ext uri="{FF2B5EF4-FFF2-40B4-BE49-F238E27FC236}">
-                <a16:creationId xmlns:a16="http://schemas.microsoft.com/office/drawing/2014/main" id="{E1277DA7-6BE0-4096-90A0-D8B8C6DF2D4C}"/>
-              </a:ext>
-            </a:extLst>
-          </p:cNvPr>
-          <p:cNvPicPr>
-            <a:picLocks noChangeAspect="1" noChangeArrowheads="1"/>
-          </p:cNvPicPr>
-          <p:nvPr/>
-        </p:nvPicPr>
-        <p:blipFill>
-          <a:blip r:embed="rId2">
-            <a:extLst>
-              <a:ext uri="{28A0092B-C50C-407E-A947-70E740481C1C}">
-                <a14:useLocalDpi xmlns:a14="http://schemas.microsoft.com/office/drawing/2010/main" val="0"/>
-              </a:ext>
-            </a:extLst>
-          </a:blip>
-          <a:srcRect/>
-          <a:stretch>
-            <a:fillRect/>
-          </a:stretch>
-        </p:blipFill>
-        <p:spPr bwMode="auto">
-          <a:xfrm>
-            <a:off x="2098637" y="1115318"/>
-            <a:ext cx="7994726" cy="5093985"/>
-          </a:xfrm>
-          <a:prstGeom prst="rect">
-            <a:avLst/>
-          </a:prstGeom>
-          <a:noFill/>
-          <a:extLst>
-            <a:ext uri="{909E8E84-426E-40DD-AFC4-6F175D3DCCD1}">
-              <a14:hiddenFill xmlns:a14="http://schemas.microsoft.com/office/drawing/2010/main">
-                <a:solidFill>
-                  <a:srgbClr val="FFFFFF"/>
-                </a:solidFill>
-              </a14:hiddenFill>
-            </a:ext>
-          </a:extLst>
+          <a:ln>
+            <a:solidFill>
+              <a:schemeClr val="tx1"/>
+            </a:solidFill>
+          </a:ln>
         </p:spPr>
       </p:pic>
     </p:spTree>
@@ -4672,10 +4498,10 @@
       </p:sp>
       <p:pic>
         <p:nvPicPr>
-          <p:cNvPr id="1034" name="Picture 10" descr="Press kit | GitLab">
+          <p:cNvPr id="1026" name="Picture 2" descr="Информационно-библиотечный центр - Инфраструктура - РТУ МИРЭА">
             <a:extLst>
               <a:ext uri="{FF2B5EF4-FFF2-40B4-BE49-F238E27FC236}">
-                <a16:creationId xmlns:a16="http://schemas.microsoft.com/office/drawing/2014/main" id="{2B2625E5-C248-44D3-AE76-080AF74D2163}"/>
+                <a16:creationId xmlns:a16="http://schemas.microsoft.com/office/drawing/2014/main" id="{B6CFBCA8-23F0-4ADE-9D52-27FF2A7C1D2D}"/>
               </a:ext>
             </a:extLst>
           </p:cNvPr>
@@ -4699,8 +4525,8 @@
         </p:blipFill>
         <p:spPr bwMode="auto">
           <a:xfrm>
-            <a:off x="5882736" y="799608"/>
-            <a:ext cx="4335462" cy="3929752"/>
+            <a:off x="614892" y="1437925"/>
+            <a:ext cx="6344708" cy="3982150"/>
           </a:xfrm>
           <a:prstGeom prst="rect">
             <a:avLst/>
@@ -4719,10 +4545,10 @@
       </p:pic>
       <p:pic>
         <p:nvPicPr>
-          <p:cNvPr id="1036" name="Picture 12" descr="GitHub logo and symbol, meaning, history, PNG">
+          <p:cNvPr id="1030" name="Picture 6">
             <a:extLst>
               <a:ext uri="{FF2B5EF4-FFF2-40B4-BE49-F238E27FC236}">
-                <a16:creationId xmlns:a16="http://schemas.microsoft.com/office/drawing/2014/main" id="{A7F16690-8683-449F-B081-BCE2F1C0DAC9}"/>
+                <a16:creationId xmlns:a16="http://schemas.microsoft.com/office/drawing/2014/main" id="{32AAB58A-87BF-4C17-B9B6-EAAD5549105B}"/>
               </a:ext>
             </a:extLst>
           </p:cNvPr>
@@ -4746,8 +4572,8 @@
         </p:blipFill>
         <p:spPr bwMode="auto">
           <a:xfrm>
-            <a:off x="1220696" y="1331520"/>
-            <a:ext cx="5094981" cy="2865927"/>
+            <a:off x="7576926" y="3607023"/>
+            <a:ext cx="4000182" cy="630237"/>
           </a:xfrm>
           <a:prstGeom prst="rect">
             <a:avLst/>
@@ -4766,10 +4592,10 @@
       </p:pic>
       <p:pic>
         <p:nvPicPr>
-          <p:cNvPr id="1038" name="Picture 14" descr="Файл:Bitbucket Logo.png — Википедия">
+          <p:cNvPr id="1032" name="Picture 8">
             <a:extLst>
               <a:ext uri="{FF2B5EF4-FFF2-40B4-BE49-F238E27FC236}">
-                <a16:creationId xmlns:a16="http://schemas.microsoft.com/office/drawing/2014/main" id="{998B871F-6724-4E81-86E8-6E3A229A1C4A}"/>
+                <a16:creationId xmlns:a16="http://schemas.microsoft.com/office/drawing/2014/main" id="{E236BB88-1408-459A-B436-E9CAD9CC2C73}"/>
               </a:ext>
             </a:extLst>
           </p:cNvPr>
@@ -4793,8 +4619,55 @@
         </p:blipFill>
         <p:spPr bwMode="auto">
           <a:xfrm>
-            <a:off x="1653636" y="4643951"/>
-            <a:ext cx="8458200" cy="1219200"/>
+            <a:off x="7576926" y="4628615"/>
+            <a:ext cx="3962400" cy="514350"/>
+          </a:xfrm>
+          <a:prstGeom prst="rect">
+            <a:avLst/>
+          </a:prstGeom>
+          <a:noFill/>
+          <a:extLst>
+            <a:ext uri="{909E8E84-426E-40DD-AFC4-6F175D3DCCD1}">
+              <a14:hiddenFill xmlns:a14="http://schemas.microsoft.com/office/drawing/2010/main">
+                <a:solidFill>
+                  <a:srgbClr val="FFFFFF"/>
+                </a:solidFill>
+              </a14:hiddenFill>
+            </a:ext>
+          </a:extLst>
+        </p:spPr>
+      </p:pic>
+      <p:pic>
+        <p:nvPicPr>
+          <p:cNvPr id="5" name="Picture 14" descr="Электронно-библиотечная система «Лань» - Муниципальные библиотеки Улан-Удэ">
+            <a:extLst>
+              <a:ext uri="{FF2B5EF4-FFF2-40B4-BE49-F238E27FC236}">
+                <a16:creationId xmlns:a16="http://schemas.microsoft.com/office/drawing/2014/main" id="{25CD5886-7A07-4DC8-B856-DBE5A976F0BA}"/>
+              </a:ext>
+            </a:extLst>
+          </p:cNvPr>
+          <p:cNvPicPr>
+            <a:picLocks noChangeAspect="1" noChangeArrowheads="1"/>
+          </p:cNvPicPr>
+          <p:nvPr/>
+        </p:nvPicPr>
+        <p:blipFill>
+          <a:blip r:embed="rId5">
+            <a:extLst>
+              <a:ext uri="{28A0092B-C50C-407E-A947-70E740481C1C}">
+                <a14:useLocalDpi xmlns:a14="http://schemas.microsoft.com/office/drawing/2010/main" val="0"/>
+              </a:ext>
+            </a:extLst>
+          </a:blip>
+          <a:srcRect/>
+          <a:stretch>
+            <a:fillRect/>
+          </a:stretch>
+        </p:blipFill>
+        <p:spPr bwMode="auto">
+          <a:xfrm>
+            <a:off x="8156046" y="1421005"/>
+            <a:ext cx="2804160" cy="1794663"/>
           </a:xfrm>
           <a:prstGeom prst="rect">
             <a:avLst/>
@@ -4867,8 +4740,8 @@
         </p:nvSpPr>
         <p:spPr>
           <a:xfrm>
-            <a:off x="4194678" y="219075"/>
-            <a:ext cx="3802644" cy="1077218"/>
+            <a:off x="2860370" y="253909"/>
+            <a:ext cx="6471259" cy="584775"/>
           </a:xfrm>
           <a:prstGeom prst="rect">
             <a:avLst/>
@@ -4883,14 +4756,7 @@
           <a:p>
             <a:r>
               <a:rPr lang="ru-RU" sz="3200" dirty="0"/>
-              <a:t>Выбор технологий</a:t>
-            </a:r>
-          </a:p>
-          <a:p>
-            <a:pPr algn="ctr"/>
-            <a:r>
-              <a:rPr lang="ru-RU" sz="3200" dirty="0"/>
-              <a:t>Серверная часть</a:t>
+              <a:t>Выбор технологий. Серверная часть</a:t>
             </a:r>
             <a:endParaRPr lang="en-US" sz="3200" dirty="0"/>
           </a:p>
@@ -4898,10 +4764,10 @@
       </p:sp>
       <p:pic>
         <p:nvPicPr>
-          <p:cNvPr id="3" name="Picture 2" descr="Java — Википедия">
+          <p:cNvPr id="2050" name="Picture 2" descr="Flutter Hive Tutorial. Hive is a lightweight and blazing fast… | by Yazan  Shekh Mohammed | Medium">
             <a:extLst>
               <a:ext uri="{FF2B5EF4-FFF2-40B4-BE49-F238E27FC236}">
-                <a16:creationId xmlns:a16="http://schemas.microsoft.com/office/drawing/2014/main" id="{429DE28D-F061-4243-A006-0EEF288FCF94}"/>
+                <a16:creationId xmlns:a16="http://schemas.microsoft.com/office/drawing/2014/main" id="{2A8FEB85-0C08-4C57-BAE8-602D5AD8C9F8}"/>
               </a:ext>
             </a:extLst>
           </p:cNvPr>
@@ -4925,8 +4791,8 @@
         </p:blipFill>
         <p:spPr bwMode="auto">
           <a:xfrm>
-            <a:off x="7502022" y="1375176"/>
-            <a:ext cx="2240189" cy="4107647"/>
+            <a:off x="6844937" y="2498247"/>
+            <a:ext cx="4532334" cy="1648121"/>
           </a:xfrm>
           <a:prstGeom prst="rect">
             <a:avLst/>
@@ -4945,10 +4811,10 @@
       </p:pic>
       <p:pic>
         <p:nvPicPr>
-          <p:cNvPr id="4" name="Picture 4" descr="Файл:Spring Framework Logo 2018.svg — Википедия">
+          <p:cNvPr id="2052" name="Picture 4">
             <a:extLst>
               <a:ext uri="{FF2B5EF4-FFF2-40B4-BE49-F238E27FC236}">
-                <a16:creationId xmlns:a16="http://schemas.microsoft.com/office/drawing/2014/main" id="{AF9BBDDB-A7A1-4148-9A0D-E839D5A10423}"/>
+                <a16:creationId xmlns:a16="http://schemas.microsoft.com/office/drawing/2014/main" id="{42DBD4AF-95B4-4A2B-8DA4-B18D0407EB9F}"/>
               </a:ext>
             </a:extLst>
           </p:cNvPr>
@@ -4972,8 +4838,8 @@
         </p:blipFill>
         <p:spPr bwMode="auto">
           <a:xfrm>
-            <a:off x="600236" y="2686887"/>
-            <a:ext cx="5763986" cy="1484226"/>
+            <a:off x="814729" y="2650671"/>
+            <a:ext cx="4981303" cy="1556657"/>
           </a:xfrm>
           <a:prstGeom prst="rect">
             <a:avLst/>
@@ -5034,35 +4900,34 @@
       </p:grpSpPr>
       <p:sp>
         <p:nvSpPr>
-          <p:cNvPr id="4" name="TextBox 3">
+          <p:cNvPr id="6" name="Прямоугольник 5">
             <a:extLst>
               <a:ext uri="{FF2B5EF4-FFF2-40B4-BE49-F238E27FC236}">
-                <a16:creationId xmlns:a16="http://schemas.microsoft.com/office/drawing/2014/main" id="{B99BE570-F7C1-4954-9395-ACC5A068B20A}"/>
+                <a16:creationId xmlns:a16="http://schemas.microsoft.com/office/drawing/2014/main" id="{228DCB9C-D97F-466B-A8BD-DDC5A7FE3364}"/>
               </a:ext>
             </a:extLst>
           </p:cNvPr>
-          <p:cNvSpPr txBox="1"/>
+          <p:cNvSpPr/>
           <p:nvPr/>
         </p:nvSpPr>
         <p:spPr>
           <a:xfrm>
-            <a:off x="3070172" y="203200"/>
-            <a:ext cx="6051657" cy="584775"/>
+            <a:off x="2803560" y="234434"/>
+            <a:ext cx="6584880" cy="584775"/>
           </a:xfrm>
           <a:prstGeom prst="rect">
             <a:avLst/>
           </a:prstGeom>
-          <a:noFill/>
-        </p:spPr>
-        <p:txBody>
-          <a:bodyPr wrap="none" rtlCol="0">
+        </p:spPr>
+        <p:txBody>
+          <a:bodyPr wrap="none">
             <a:spAutoFit/>
           </a:bodyPr>
           <a:lstStyle/>
           <a:p>
             <a:r>
               <a:rPr lang="ru-RU" sz="3200" dirty="0"/>
-              <a:t>Архитектура серверной части</a:t>
+              <a:t>Выбор технологий. Клиентская часть</a:t>
             </a:r>
             <a:endParaRPr lang="en-US" sz="3200" dirty="0"/>
           </a:p>
@@ -5070,10 +4935,10 @@
       </p:sp>
       <p:pic>
         <p:nvPicPr>
-          <p:cNvPr id="4098" name="Picture 2" descr="Работа с RESTful API. Часть I.. REST (Representational state transfer)—… |  by Usupovman | Medium">
+          <p:cNvPr id="7" name="Picture 2" descr="Файл:Google-flutter-logo.png — Википедия">
             <a:extLst>
               <a:ext uri="{FF2B5EF4-FFF2-40B4-BE49-F238E27FC236}">
-                <a16:creationId xmlns:a16="http://schemas.microsoft.com/office/drawing/2014/main" id="{56DE04A1-745A-493E-87EC-7AAE28CA04CA}"/>
+                <a16:creationId xmlns:a16="http://schemas.microsoft.com/office/drawing/2014/main" id="{C375E770-7190-45C7-BA0C-A0CA3B5191A0}"/>
               </a:ext>
             </a:extLst>
           </p:cNvPr>
@@ -5097,8 +4962,8 @@
         </p:blipFill>
         <p:spPr bwMode="auto">
           <a:xfrm>
-            <a:off x="4930172" y="1984566"/>
-            <a:ext cx="5502257" cy="3316559"/>
+            <a:off x="1028101" y="2763131"/>
+            <a:ext cx="4666924" cy="1331738"/>
           </a:xfrm>
           <a:prstGeom prst="rect">
             <a:avLst/>
@@ -5117,10 +4982,10 @@
       </p:pic>
       <p:pic>
         <p:nvPicPr>
-          <p:cNvPr id="10" name="Picture 2" descr="Java — Википедия">
+          <p:cNvPr id="3074" name="Picture 2" descr="GitHub - felangel/bloc: A predictable state management library that helps  implement the BLoC design pattern">
             <a:extLst>
               <a:ext uri="{FF2B5EF4-FFF2-40B4-BE49-F238E27FC236}">
-                <a16:creationId xmlns:a16="http://schemas.microsoft.com/office/drawing/2014/main" id="{6EF38BB5-9144-4054-8DA2-23B7AD798BE4}"/>
+                <a16:creationId xmlns:a16="http://schemas.microsoft.com/office/drawing/2014/main" id="{1704C132-5E3B-4298-8017-BC5996CF14E3}"/>
               </a:ext>
             </a:extLst>
           </p:cNvPr>
@@ -5144,8 +5009,8 @@
         </p:blipFill>
         <p:spPr bwMode="auto">
           <a:xfrm>
-            <a:off x="1178239" y="1504016"/>
-            <a:ext cx="2099659" cy="3849968"/>
+            <a:off x="6902430" y="2471556"/>
+            <a:ext cx="4261469" cy="1914887"/>
           </a:xfrm>
           <a:prstGeom prst="rect">
             <a:avLst/>
@@ -5162,104 +5027,10 @@
           </a:extLst>
         </p:spPr>
       </p:pic>
-      <p:pic>
-        <p:nvPicPr>
-          <p:cNvPr id="13" name="Picture 4" descr="Файл:Spring Framework Logo 2018.svg — Википедия">
-            <a:extLst>
-              <a:ext uri="{FF2B5EF4-FFF2-40B4-BE49-F238E27FC236}">
-                <a16:creationId xmlns:a16="http://schemas.microsoft.com/office/drawing/2014/main" id="{A41D6212-7069-4DBF-A7AB-AA1B882F9FB3}"/>
-              </a:ext>
-            </a:extLst>
-          </p:cNvPr>
-          <p:cNvPicPr>
-            <a:picLocks noChangeAspect="1" noChangeArrowheads="1"/>
-          </p:cNvPicPr>
-          <p:nvPr/>
-        </p:nvPicPr>
-        <p:blipFill>
-          <a:blip r:embed="rId4">
-            <a:extLst>
-              <a:ext uri="{28A0092B-C50C-407E-A947-70E740481C1C}">
-                <a14:useLocalDpi xmlns:a14="http://schemas.microsoft.com/office/drawing/2010/main" val="0"/>
-              </a:ext>
-            </a:extLst>
-          </a:blip>
-          <a:srcRect/>
-          <a:stretch>
-            <a:fillRect/>
-          </a:stretch>
-        </p:blipFill>
-        <p:spPr bwMode="auto">
-          <a:xfrm>
-            <a:off x="4799308" y="1458878"/>
-            <a:ext cx="5763986" cy="1484226"/>
-          </a:xfrm>
-          <a:prstGeom prst="rect">
-            <a:avLst/>
-          </a:prstGeom>
-          <a:noFill/>
-          <a:extLst>
-            <a:ext uri="{909E8E84-426E-40DD-AFC4-6F175D3DCCD1}">
-              <a14:hiddenFill xmlns:a14="http://schemas.microsoft.com/office/drawing/2010/main">
-                <a:solidFill>
-                  <a:srgbClr val="FFFFFF"/>
-                </a:solidFill>
-              </a14:hiddenFill>
-            </a:ext>
-          </a:extLst>
-        </p:spPr>
-      </p:pic>
-      <p:pic>
-        <p:nvPicPr>
-          <p:cNvPr id="4102" name="Picture 6" descr="Файл:MongoDB Logo.svg — Википедия">
-            <a:extLst>
-              <a:ext uri="{FF2B5EF4-FFF2-40B4-BE49-F238E27FC236}">
-                <a16:creationId xmlns:a16="http://schemas.microsoft.com/office/drawing/2014/main" id="{DF0AF400-8579-443D-9C91-97E5DEB48566}"/>
-              </a:ext>
-            </a:extLst>
-          </p:cNvPr>
-          <p:cNvPicPr>
-            <a:picLocks noChangeAspect="1" noChangeArrowheads="1"/>
-          </p:cNvPicPr>
-          <p:nvPr/>
-        </p:nvPicPr>
-        <p:blipFill>
-          <a:blip r:embed="rId5">
-            <a:extLst>
-              <a:ext uri="{28A0092B-C50C-407E-A947-70E740481C1C}">
-                <a14:useLocalDpi xmlns:a14="http://schemas.microsoft.com/office/drawing/2010/main" val="0"/>
-              </a:ext>
-            </a:extLst>
-          </a:blip>
-          <a:srcRect/>
-          <a:stretch>
-            <a:fillRect/>
-          </a:stretch>
-        </p:blipFill>
-        <p:spPr bwMode="auto">
-          <a:xfrm>
-            <a:off x="4268628" y="3987170"/>
-            <a:ext cx="6825343" cy="1839643"/>
-          </a:xfrm>
-          <a:prstGeom prst="rect">
-            <a:avLst/>
-          </a:prstGeom>
-          <a:noFill/>
-          <a:extLst>
-            <a:ext uri="{909E8E84-426E-40DD-AFC4-6F175D3DCCD1}">
-              <a14:hiddenFill xmlns:a14="http://schemas.microsoft.com/office/drawing/2010/main">
-                <a:solidFill>
-                  <a:srgbClr val="FFFFFF"/>
-                </a:solidFill>
-              </a14:hiddenFill>
-            </a:ext>
-          </a:extLst>
-        </p:spPr>
-      </p:pic>
     </p:spTree>
     <p:extLst>
       <p:ext uri="{BB962C8B-B14F-4D97-AF65-F5344CB8AC3E}">
-        <p14:creationId xmlns:p14="http://schemas.microsoft.com/office/powerpoint/2010/main" val="44436994"/>
+        <p14:creationId xmlns:p14="http://schemas.microsoft.com/office/powerpoint/2010/main" val="1317781831"/>
       </p:ext>
     </p:extLst>
   </p:cSld>
@@ -5312,8 +5083,8 @@
         </p:nvSpPr>
         <p:spPr>
           <a:xfrm>
-            <a:off x="3632024" y="190890"/>
-            <a:ext cx="4927952" cy="584775"/>
+            <a:off x="3527316" y="173473"/>
+            <a:ext cx="5137368" cy="584775"/>
           </a:xfrm>
           <a:prstGeom prst="rect">
             <a:avLst/>
@@ -5327,7 +5098,7 @@
           <a:p>
             <a:r>
               <a:rPr lang="ru-RU" sz="3200" dirty="0"/>
-              <a:t>Сборка серверной части</a:t>
+              <a:t>Развертывание приложения</a:t>
             </a:r>
             <a:endParaRPr lang="en-US" sz="3200" dirty="0"/>
           </a:p>
@@ -5335,10 +5106,10 @@
       </p:sp>
       <p:pic>
         <p:nvPicPr>
-          <p:cNvPr id="5122" name="Picture 2" descr="Docker Logos | Docker">
+          <p:cNvPr id="4100" name="Picture 4" descr="Heroku - что это за облачная платформа, хостинг">
             <a:extLst>
               <a:ext uri="{FF2B5EF4-FFF2-40B4-BE49-F238E27FC236}">
-                <a16:creationId xmlns:a16="http://schemas.microsoft.com/office/drawing/2014/main" id="{44C790F4-C1DE-4C6D-86AE-240078D8B383}"/>
+                <a16:creationId xmlns:a16="http://schemas.microsoft.com/office/drawing/2014/main" id="{28DC3A3F-A4DC-44BC-B408-FF51177C1AF3}"/>
               </a:ext>
             </a:extLst>
           </p:cNvPr>
@@ -5362,8 +5133,8 @@
         </p:blipFill>
         <p:spPr bwMode="auto">
           <a:xfrm>
-            <a:off x="2852631" y="3702582"/>
-            <a:ext cx="6486737" cy="1667555"/>
+            <a:off x="3527316" y="1407919"/>
+            <a:ext cx="4763589" cy="1332316"/>
           </a:xfrm>
           <a:prstGeom prst="rect">
             <a:avLst/>
@@ -5382,16 +5153,14 @@
       </p:pic>
       <p:pic>
         <p:nvPicPr>
-          <p:cNvPr id="5124" name="Picture 4" descr="Файл:Gradle logo.png — Википедия">
+          <p:cNvPr id="8" name="Рисунок 7">
             <a:extLst>
               <a:ext uri="{FF2B5EF4-FFF2-40B4-BE49-F238E27FC236}">
-                <a16:creationId xmlns:a16="http://schemas.microsoft.com/office/drawing/2014/main" id="{32BA5ABE-8817-45ED-99F1-9D9C00F3FD4B}"/>
+                <a16:creationId xmlns:a16="http://schemas.microsoft.com/office/drawing/2014/main" id="{9381462C-E27B-4999-B0E7-710D6C87E855}"/>
               </a:ext>
             </a:extLst>
           </p:cNvPr>
-          <p:cNvPicPr>
-            <a:picLocks noChangeAspect="1" noChangeArrowheads="1"/>
-          </p:cNvPicPr>
+          <p:cNvPicPr/>
           <p:nvPr/>
         </p:nvPicPr>
         <p:blipFill>
@@ -5409,22 +5178,16 @@
         </p:blipFill>
         <p:spPr bwMode="auto">
           <a:xfrm>
-            <a:off x="2539294" y="944178"/>
-            <a:ext cx="7113412" cy="2484822"/>
+            <a:off x="2114093" y="3554281"/>
+            <a:ext cx="7963813" cy="1269274"/>
           </a:xfrm>
           <a:prstGeom prst="rect">
             <a:avLst/>
           </a:prstGeom>
           <a:noFill/>
-          <a:extLst>
-            <a:ext uri="{909E8E84-426E-40DD-AFC4-6F175D3DCCD1}">
-              <a14:hiddenFill xmlns:a14="http://schemas.microsoft.com/office/drawing/2010/main">
-                <a:solidFill>
-                  <a:srgbClr val="FFFFFF"/>
-                </a:solidFill>
-              </a14:hiddenFill>
-            </a:ext>
-          </a:extLst>
+          <a:ln>
+            <a:noFill/>
+          </a:ln>
         </p:spPr>
       </p:pic>
     </p:spTree>
@@ -5471,10 +5234,10 @@
       </p:grpSpPr>
       <p:sp>
         <p:nvSpPr>
-          <p:cNvPr id="6" name="Прямоугольник 5">
+          <p:cNvPr id="3" name="Прямоугольник 2">
             <a:extLst>
               <a:ext uri="{FF2B5EF4-FFF2-40B4-BE49-F238E27FC236}">
-                <a16:creationId xmlns:a16="http://schemas.microsoft.com/office/drawing/2014/main" id="{228DCB9C-D97F-466B-A8BD-DDC5A7FE3364}"/>
+                <a16:creationId xmlns:a16="http://schemas.microsoft.com/office/drawing/2014/main" id="{0607F79B-E9C9-4988-B9FA-EB7AA6276304}"/>
               </a:ext>
             </a:extLst>
           </p:cNvPr>
@@ -5483,22 +5246,22 @@
         </p:nvSpPr>
         <p:spPr>
           <a:xfrm>
-            <a:off x="2927504" y="190891"/>
-            <a:ext cx="6336991" cy="584775"/>
+            <a:off x="3083638" y="257293"/>
+            <a:ext cx="6024723" cy="584775"/>
           </a:xfrm>
           <a:prstGeom prst="rect">
             <a:avLst/>
           </a:prstGeom>
         </p:spPr>
         <p:txBody>
-          <a:bodyPr wrap="none">
+          <a:bodyPr wrap="square">
             <a:spAutoFit/>
           </a:bodyPr>
           <a:lstStyle/>
           <a:p>
             <a:r>
               <a:rPr lang="ru-RU" sz="3200" dirty="0"/>
-              <a:t>Архитектура клиентской части</a:t>
+              <a:t>Окно авторизации и регистрации</a:t>
             </a:r>
             <a:endParaRPr lang="en-US" sz="3200" dirty="0"/>
           </a:p>
@@ -5506,149 +5269,43 @@
       </p:sp>
       <p:pic>
         <p:nvPicPr>
-          <p:cNvPr id="6150" name="Picture 6" descr="Файл:MVC-Process.png — Википедия">
+          <p:cNvPr id="4" name="Рисунок 3">
             <a:extLst>
               <a:ext uri="{FF2B5EF4-FFF2-40B4-BE49-F238E27FC236}">
-                <a16:creationId xmlns:a16="http://schemas.microsoft.com/office/drawing/2014/main" id="{DA097501-7641-48F7-B028-13E7058D6556}"/>
+                <a16:creationId xmlns:a16="http://schemas.microsoft.com/office/drawing/2014/main" id="{94A76D24-8A79-4DBB-ACBD-0639747E7788}"/>
               </a:ext>
             </a:extLst>
           </p:cNvPr>
           <p:cNvPicPr>
-            <a:picLocks noChangeAspect="1" noChangeArrowheads="1"/>
+            <a:picLocks noChangeAspect="1"/>
           </p:cNvPicPr>
           <p:nvPr/>
         </p:nvPicPr>
         <p:blipFill>
-          <a:blip r:embed="rId2">
-            <a:extLst>
-              <a:ext uri="{28A0092B-C50C-407E-A947-70E740481C1C}">
-                <a14:useLocalDpi xmlns:a14="http://schemas.microsoft.com/office/drawing/2010/main" val="0"/>
-              </a:ext>
-            </a:extLst>
-          </a:blip>
-          <a:srcRect/>
+          <a:blip r:embed="rId2"/>
           <a:stretch>
             <a:fillRect/>
           </a:stretch>
         </p:blipFill>
-        <p:spPr bwMode="auto">
-          <a:xfrm>
-            <a:off x="6678871" y="1074284"/>
-            <a:ext cx="4281302" cy="4709432"/>
+        <p:spPr>
+          <a:xfrm>
+            <a:off x="1402080" y="1478033"/>
+            <a:ext cx="9387840" cy="3648228"/>
           </a:xfrm>
           <a:prstGeom prst="rect">
             <a:avLst/>
           </a:prstGeom>
-          <a:noFill/>
-          <a:extLst>
-            <a:ext uri="{909E8E84-426E-40DD-AFC4-6F175D3DCCD1}">
-              <a14:hiddenFill xmlns:a14="http://schemas.microsoft.com/office/drawing/2010/main">
-                <a:solidFill>
-                  <a:srgbClr val="FFFFFF"/>
-                </a:solidFill>
-              </a14:hiddenFill>
-            </a:ext>
-          </a:extLst>
-        </p:spPr>
-      </p:pic>
-      <p:pic>
-        <p:nvPicPr>
-          <p:cNvPr id="7" name="Picture 2" descr="Файл:Google-flutter-logo.png — Википедия">
-            <a:extLst>
-              <a:ext uri="{FF2B5EF4-FFF2-40B4-BE49-F238E27FC236}">
-                <a16:creationId xmlns:a16="http://schemas.microsoft.com/office/drawing/2014/main" id="{C375E770-7190-45C7-BA0C-A0CA3B5191A0}"/>
-              </a:ext>
-            </a:extLst>
-          </p:cNvPr>
-          <p:cNvPicPr>
-            <a:picLocks noChangeAspect="1" noChangeArrowheads="1"/>
-          </p:cNvPicPr>
-          <p:nvPr/>
-        </p:nvPicPr>
-        <p:blipFill>
-          <a:blip r:embed="rId3">
-            <a:extLst>
-              <a:ext uri="{28A0092B-C50C-407E-A947-70E740481C1C}">
-                <a14:useLocalDpi xmlns:a14="http://schemas.microsoft.com/office/drawing/2010/main" val="0"/>
-              </a:ext>
-            </a:extLst>
-          </a:blip>
-          <a:srcRect/>
-          <a:stretch>
-            <a:fillRect/>
-          </a:stretch>
-        </p:blipFill>
-        <p:spPr bwMode="auto">
-          <a:xfrm>
-            <a:off x="1038234" y="1693846"/>
-            <a:ext cx="4666924" cy="1331738"/>
-          </a:xfrm>
-          <a:prstGeom prst="rect">
-            <a:avLst/>
-          </a:prstGeom>
-          <a:noFill/>
-          <a:extLst>
-            <a:ext uri="{909E8E84-426E-40DD-AFC4-6F175D3DCCD1}">
-              <a14:hiddenFill xmlns:a14="http://schemas.microsoft.com/office/drawing/2010/main">
-                <a:solidFill>
-                  <a:srgbClr val="FFFFFF"/>
-                </a:solidFill>
-              </a14:hiddenFill>
-            </a:ext>
-          </a:extLst>
-        </p:spPr>
-      </p:pic>
-      <p:pic>
-        <p:nvPicPr>
-          <p:cNvPr id="6152" name="Picture 8" descr="File:Dart programming language logo.svg - Wikimedia Commons">
-            <a:extLst>
-              <a:ext uri="{FF2B5EF4-FFF2-40B4-BE49-F238E27FC236}">
-                <a16:creationId xmlns:a16="http://schemas.microsoft.com/office/drawing/2014/main" id="{F3CBC692-689E-4215-9827-5347BD2CAC6B}"/>
-              </a:ext>
-            </a:extLst>
-          </p:cNvPr>
-          <p:cNvPicPr>
-            <a:picLocks noChangeAspect="1" noChangeArrowheads="1"/>
-          </p:cNvPicPr>
-          <p:nvPr/>
-        </p:nvPicPr>
-        <p:blipFill>
-          <a:blip r:embed="rId4">
-            <a:extLst>
-              <a:ext uri="{28A0092B-C50C-407E-A947-70E740481C1C}">
-                <a14:useLocalDpi xmlns:a14="http://schemas.microsoft.com/office/drawing/2010/main" val="0"/>
-              </a:ext>
-            </a:extLst>
-          </a:blip>
-          <a:srcRect/>
-          <a:stretch>
-            <a:fillRect/>
-          </a:stretch>
-        </p:blipFill>
-        <p:spPr bwMode="auto">
-          <a:xfrm>
-            <a:off x="1230261" y="3772133"/>
-            <a:ext cx="4282870" cy="1331738"/>
-          </a:xfrm>
-          <a:prstGeom prst="rect">
-            <a:avLst/>
-          </a:prstGeom>
-          <a:noFill/>
-          <a:extLst>
-            <a:ext uri="{909E8E84-426E-40DD-AFC4-6F175D3DCCD1}">
-              <a14:hiddenFill xmlns:a14="http://schemas.microsoft.com/office/drawing/2010/main">
-                <a:solidFill>
-                  <a:srgbClr val="FFFFFF"/>
-                </a:solidFill>
-              </a14:hiddenFill>
-            </a:ext>
-          </a:extLst>
+          <a:ln>
+            <a:solidFill>
+              <a:schemeClr val="tx1"/>
+            </a:solidFill>
+          </a:ln>
         </p:spPr>
       </p:pic>
     </p:spTree>
     <p:extLst>
       <p:ext uri="{BB962C8B-B14F-4D97-AF65-F5344CB8AC3E}">
-        <p14:creationId xmlns:p14="http://schemas.microsoft.com/office/powerpoint/2010/main" val="1317781831"/>
+        <p14:creationId xmlns:p14="http://schemas.microsoft.com/office/powerpoint/2010/main" val="4097587567"/>
       </p:ext>
     </p:extLst>
   </p:cSld>
@@ -5689,10 +5346,10 @@
       </p:grpSpPr>
       <p:sp>
         <p:nvSpPr>
-          <p:cNvPr id="3" name="Прямоугольник 2">
+          <p:cNvPr id="2" name="Прямоугольник 1">
             <a:extLst>
               <a:ext uri="{FF2B5EF4-FFF2-40B4-BE49-F238E27FC236}">
-                <a16:creationId xmlns:a16="http://schemas.microsoft.com/office/drawing/2014/main" id="{0607F79B-E9C9-4988-B9FA-EB7AA6276304}"/>
+                <a16:creationId xmlns:a16="http://schemas.microsoft.com/office/drawing/2014/main" id="{C1DBA0B5-9AA6-4D07-97F1-40FE67F23A2A}"/>
               </a:ext>
             </a:extLst>
           </p:cNvPr>
@@ -5701,8 +5358,8 @@
         </p:nvSpPr>
         <p:spPr>
           <a:xfrm>
-            <a:off x="2683848" y="239875"/>
-            <a:ext cx="6824304" cy="584775"/>
+            <a:off x="2795866" y="266003"/>
+            <a:ext cx="6600268" cy="584775"/>
           </a:xfrm>
           <a:prstGeom prst="rect">
             <a:avLst/>
@@ -5716,7 +5373,7 @@
           <a:p>
             <a:r>
               <a:rPr lang="ru-RU" sz="3200" dirty="0"/>
-              <a:t>Окно авторизации и регистрации</a:t>
+              <a:t>Панель администратора библиотеки</a:t>
             </a:r>
             <a:endParaRPr lang="en-US" sz="3200" dirty="0"/>
           </a:p>
@@ -5724,60 +5381,41 @@
       </p:sp>
       <p:pic>
         <p:nvPicPr>
-          <p:cNvPr id="2050" name="Picture 2" descr="https://cdn.discordapp.com/attachments/912348055511113748/912356113578614804/unknown.png">
+          <p:cNvPr id="4" name="Рисунок 3">
             <a:extLst>
               <a:ext uri="{FF2B5EF4-FFF2-40B4-BE49-F238E27FC236}">
-                <a16:creationId xmlns:a16="http://schemas.microsoft.com/office/drawing/2014/main" id="{348FD6B7-3D54-43AB-965C-BE8E16723556}"/>
+                <a16:creationId xmlns:a16="http://schemas.microsoft.com/office/drawing/2014/main" id="{D1D77204-A4E4-4F23-ADF5-4A8058236C53}"/>
               </a:ext>
             </a:extLst>
           </p:cNvPr>
-          <p:cNvPicPr>
-            <a:picLocks noChangeAspect="1" noChangeArrowheads="1"/>
-          </p:cNvPicPr>
+          <p:cNvPicPr/>
           <p:nvPr/>
         </p:nvPicPr>
         <p:blipFill>
-          <a:blip r:embed="rId2">
-            <a:extLst>
-              <a:ext uri="{28A0092B-C50C-407E-A947-70E740481C1C}">
-                <a14:useLocalDpi xmlns:a14="http://schemas.microsoft.com/office/drawing/2010/main" val="0"/>
-              </a:ext>
-            </a:extLst>
-          </a:blip>
-          <a:srcRect/>
+          <a:blip r:embed="rId2"/>
           <a:stretch>
             <a:fillRect/>
           </a:stretch>
         </p:blipFill>
-        <p:spPr bwMode="auto">
-          <a:xfrm>
-            <a:off x="1134893" y="1971675"/>
-            <a:ext cx="9922213" cy="2914650"/>
+        <p:spPr>
+          <a:xfrm>
+            <a:off x="3293745" y="850778"/>
+            <a:ext cx="5604510" cy="5313136"/>
           </a:xfrm>
           <a:prstGeom prst="rect">
             <a:avLst/>
           </a:prstGeom>
-          <a:noFill/>
           <a:ln>
             <a:solidFill>
-              <a:schemeClr val="accent1"/>
+              <a:schemeClr val="tx1"/>
             </a:solidFill>
           </a:ln>
-          <a:extLst>
-            <a:ext uri="{909E8E84-426E-40DD-AFC4-6F175D3DCCD1}">
-              <a14:hiddenFill xmlns:a14="http://schemas.microsoft.com/office/drawing/2010/main">
-                <a:solidFill>
-                  <a:srgbClr val="FFFFFF"/>
-                </a:solidFill>
-              </a14:hiddenFill>
-            </a:ext>
-          </a:extLst>
         </p:spPr>
       </p:pic>
     </p:spTree>
     <p:extLst>
       <p:ext uri="{BB962C8B-B14F-4D97-AF65-F5344CB8AC3E}">
-        <p14:creationId xmlns:p14="http://schemas.microsoft.com/office/powerpoint/2010/main" val="4097587567"/>
+        <p14:creationId xmlns:p14="http://schemas.microsoft.com/office/powerpoint/2010/main" val="1936979492"/>
       </p:ext>
     </p:extLst>
   </p:cSld>
@@ -5818,10 +5456,10 @@
       </p:grpSpPr>
       <p:sp>
         <p:nvSpPr>
-          <p:cNvPr id="2" name="Прямоугольник 1">
+          <p:cNvPr id="3" name="Прямоугольник 2">
             <a:extLst>
               <a:ext uri="{FF2B5EF4-FFF2-40B4-BE49-F238E27FC236}">
-                <a16:creationId xmlns:a16="http://schemas.microsoft.com/office/drawing/2014/main" id="{C1DBA0B5-9AA6-4D07-97F1-40FE67F23A2A}"/>
+                <a16:creationId xmlns:a16="http://schemas.microsoft.com/office/drawing/2014/main" id="{0607F79B-E9C9-4988-B9FA-EB7AA6276304}"/>
               </a:ext>
             </a:extLst>
           </p:cNvPr>
@@ -5830,22 +5468,23 @@
         </p:nvSpPr>
         <p:spPr>
           <a:xfrm>
-            <a:off x="3506988" y="239877"/>
-            <a:ext cx="5585183" cy="584775"/>
+            <a:off x="2305485" y="172279"/>
+            <a:ext cx="7581029" cy="584775"/>
           </a:xfrm>
           <a:prstGeom prst="rect">
             <a:avLst/>
           </a:prstGeom>
         </p:spPr>
         <p:txBody>
-          <a:bodyPr wrap="none">
+          <a:bodyPr wrap="square">
             <a:spAutoFit/>
           </a:bodyPr>
           <a:lstStyle/>
           <a:p>
+            <a:pPr algn="ctr"/>
             <a:r>
               <a:rPr lang="ru-RU" sz="3200" dirty="0"/>
-              <a:t>Окно выбора версии файла</a:t>
+              <a:t>Добавление новых книг</a:t>
             </a:r>
             <a:endParaRPr lang="en-US" sz="3200" dirty="0"/>
           </a:p>
@@ -5853,20 +5492,51 @@
       </p:sp>
       <p:pic>
         <p:nvPicPr>
-          <p:cNvPr id="3074" name="Picture 2" descr="https://cdn.discordapp.com/attachments/912348055511113748/912356330365403196/unknown.png">
+          <p:cNvPr id="4" name="Рисунок 3">
             <a:extLst>
               <a:ext uri="{FF2B5EF4-FFF2-40B4-BE49-F238E27FC236}">
-                <a16:creationId xmlns:a16="http://schemas.microsoft.com/office/drawing/2014/main" id="{A9B1477B-271C-4B47-9BCC-C7BEA28E6B05}"/>
+                <a16:creationId xmlns:a16="http://schemas.microsoft.com/office/drawing/2014/main" id="{1CA95936-7F9A-47B7-95D2-B2CF4271216C}"/>
               </a:ext>
             </a:extLst>
           </p:cNvPr>
-          <p:cNvPicPr>
-            <a:picLocks noChangeAspect="1" noChangeArrowheads="1"/>
-          </p:cNvPicPr>
+          <p:cNvPicPr/>
           <p:nvPr/>
         </p:nvPicPr>
         <p:blipFill>
-          <a:blip r:embed="rId2">
+          <a:blip r:embed="rId2"/>
+          <a:stretch>
+            <a:fillRect/>
+          </a:stretch>
+        </p:blipFill>
+        <p:spPr>
+          <a:xfrm>
+            <a:off x="767081" y="1837615"/>
+            <a:ext cx="3769634" cy="3182767"/>
+          </a:xfrm>
+          <a:prstGeom prst="rect">
+            <a:avLst/>
+          </a:prstGeom>
+          <a:ln>
+            <a:solidFill>
+              <a:schemeClr val="tx1"/>
+            </a:solidFill>
+          </a:ln>
+        </p:spPr>
+      </p:pic>
+      <p:pic>
+        <p:nvPicPr>
+          <p:cNvPr id="5" name="Рисунок 4">
+            <a:extLst>
+              <a:ext uri="{FF2B5EF4-FFF2-40B4-BE49-F238E27FC236}">
+                <a16:creationId xmlns:a16="http://schemas.microsoft.com/office/drawing/2014/main" id="{0C76EF91-0EB7-46B5-BDBD-3E3AB5B60E94}"/>
+              </a:ext>
+            </a:extLst>
+          </p:cNvPr>
+          <p:cNvPicPr/>
+          <p:nvPr/>
+        </p:nvPicPr>
+        <p:blipFill>
+          <a:blip r:embed="rId3">
             <a:extLst>
               <a:ext uri="{28A0092B-C50C-407E-A947-70E740481C1C}">
                 <a14:useLocalDpi xmlns:a14="http://schemas.microsoft.com/office/drawing/2010/main" val="0"/>
@@ -5880,33 +5550,22 @@
         </p:blipFill>
         <p:spPr bwMode="auto">
           <a:xfrm>
-            <a:off x="838200" y="2493139"/>
-            <a:ext cx="10515600" cy="1871722"/>
+            <a:off x="6095999" y="1169987"/>
+            <a:ext cx="5328920" cy="4518025"/>
           </a:xfrm>
           <a:prstGeom prst="rect">
             <a:avLst/>
           </a:prstGeom>
           <a:noFill/>
           <a:ln>
-            <a:solidFill>
-              <a:schemeClr val="accent1"/>
-            </a:solidFill>
+            <a:noFill/>
           </a:ln>
-          <a:extLst>
-            <a:ext uri="{909E8E84-426E-40DD-AFC4-6F175D3DCCD1}">
-              <a14:hiddenFill xmlns:a14="http://schemas.microsoft.com/office/drawing/2010/main">
-                <a:solidFill>
-                  <a:srgbClr val="FFFFFF"/>
-                </a:solidFill>
-              </a14:hiddenFill>
-            </a:ext>
-          </a:extLst>
         </p:spPr>
       </p:pic>
     </p:spTree>
     <p:extLst>
       <p:ext uri="{BB962C8B-B14F-4D97-AF65-F5344CB8AC3E}">
-        <p14:creationId xmlns:p14="http://schemas.microsoft.com/office/powerpoint/2010/main" val="1936979492"/>
+        <p14:creationId xmlns:p14="http://schemas.microsoft.com/office/powerpoint/2010/main" val="2538338921"/>
       </p:ext>
     </p:extLst>
   </p:cSld>
@@ -5950,7 +5609,7 @@
           <p:cNvPr id="3" name="Прямоугольник 2">
             <a:extLst>
               <a:ext uri="{FF2B5EF4-FFF2-40B4-BE49-F238E27FC236}">
-                <a16:creationId xmlns:a16="http://schemas.microsoft.com/office/drawing/2014/main" id="{0607F79B-E9C9-4988-B9FA-EB7AA6276304}"/>
+                <a16:creationId xmlns:a16="http://schemas.microsoft.com/office/drawing/2014/main" id="{49AA2B79-CD4D-4D53-8055-35A7B6E2A1B4}"/>
               </a:ext>
             </a:extLst>
           </p:cNvPr>
@@ -5959,8 +5618,8 @@
         </p:nvSpPr>
         <p:spPr>
           <a:xfrm>
-            <a:off x="2305485" y="172279"/>
-            <a:ext cx="7581029" cy="1569660"/>
+            <a:off x="2289132" y="262452"/>
+            <a:ext cx="7613735" cy="1077218"/>
           </a:xfrm>
           <a:prstGeom prst="rect">
             <a:avLst/>
@@ -5975,68 +5634,49 @@
             <a:pPr algn="ctr"/>
             <a:r>
               <a:rPr lang="ru-RU" sz="3200" dirty="0"/>
-              <a:t>Окно загрузки файлов, выбора имени, сохранения версии и скачивания файла</a:t>
-            </a:r>
-            <a:endParaRPr lang="en-US" sz="3200" dirty="0"/>
+              <a:t>Форма изменения информации о добавленной книге</a:t>
+            </a:r>
+            <a:endParaRPr lang="en-US" sz="4800" dirty="0"/>
           </a:p>
         </p:txBody>
       </p:sp>
       <p:pic>
         <p:nvPicPr>
-          <p:cNvPr id="4098" name="Picture 2" descr="https://cdn.discordapp.com/attachments/912348055511113748/912357131913662494/unknown.png">
+          <p:cNvPr id="4" name="Рисунок 3">
             <a:extLst>
               <a:ext uri="{FF2B5EF4-FFF2-40B4-BE49-F238E27FC236}">
-                <a16:creationId xmlns:a16="http://schemas.microsoft.com/office/drawing/2014/main" id="{084FE466-E662-4267-90EC-2B3B7F677CCA}"/>
+                <a16:creationId xmlns:a16="http://schemas.microsoft.com/office/drawing/2014/main" id="{A07A4BE7-2DAC-45FD-9183-E59FB7B3050C}"/>
               </a:ext>
             </a:extLst>
           </p:cNvPr>
-          <p:cNvPicPr>
-            <a:picLocks noChangeAspect="1" noChangeArrowheads="1"/>
-          </p:cNvPicPr>
+          <p:cNvPicPr/>
           <p:nvPr/>
         </p:nvPicPr>
         <p:blipFill>
-          <a:blip r:embed="rId2">
-            <a:extLst>
-              <a:ext uri="{28A0092B-C50C-407E-A947-70E740481C1C}">
-                <a14:useLocalDpi xmlns:a14="http://schemas.microsoft.com/office/drawing/2010/main" val="0"/>
-              </a:ext>
-            </a:extLst>
-          </a:blip>
-          <a:srcRect/>
+          <a:blip r:embed="rId2"/>
           <a:stretch>
             <a:fillRect/>
           </a:stretch>
         </p:blipFill>
-        <p:spPr bwMode="auto">
-          <a:xfrm>
-            <a:off x="630067" y="2072481"/>
-            <a:ext cx="10931864" cy="2713038"/>
+        <p:spPr>
+          <a:xfrm>
+            <a:off x="3768022" y="1392895"/>
+            <a:ext cx="4655956" cy="4072210"/>
           </a:xfrm>
           <a:prstGeom prst="rect">
             <a:avLst/>
           </a:prstGeom>
-          <a:noFill/>
           <a:ln>
             <a:solidFill>
-              <a:schemeClr val="accent1"/>
+              <a:schemeClr val="tx1"/>
             </a:solidFill>
           </a:ln>
-          <a:extLst>
-            <a:ext uri="{909E8E84-426E-40DD-AFC4-6F175D3DCCD1}">
-              <a14:hiddenFill xmlns:a14="http://schemas.microsoft.com/office/drawing/2010/main">
-                <a:solidFill>
-                  <a:srgbClr val="FFFFFF"/>
-                </a:solidFill>
-              </a14:hiddenFill>
-            </a:ext>
-          </a:extLst>
         </p:spPr>
       </p:pic>
     </p:spTree>
     <p:extLst>
       <p:ext uri="{BB962C8B-B14F-4D97-AF65-F5344CB8AC3E}">
-        <p14:creationId xmlns:p14="http://schemas.microsoft.com/office/powerpoint/2010/main" val="2538338921"/>
+        <p14:creationId xmlns:p14="http://schemas.microsoft.com/office/powerpoint/2010/main" val="2690175273"/>
       </p:ext>
     </p:extLst>
   </p:cSld>

</xml_diff>

<commit_message>
7th semester has begun
</commit_message>
<xml_diff>
--- a/3rd-Grade/Sixth-Semester/Course-Project/docs/Московка_АА_Презентация.pptx
+++ b/3rd-Grade/Sixth-Semester/Course-Project/docs/Московка_АА_Презентация.pptx
@@ -348,7 +348,7 @@
           <a:p>
             <a:fld id="{48A87A34-81AB-432B-8DAE-1953F412C126}" type="datetimeFigureOut">
               <a:rPr lang="en-US" smtClean="0"/>
-              <a:t>5/10/2022</a:t>
+              <a:t>6/11/2022</a:t>
             </a:fld>
             <a:endParaRPr lang="en-US" dirty="0"/>
           </a:p>
@@ -556,7 +556,7 @@
           <a:p>
             <a:fld id="{48A87A34-81AB-432B-8DAE-1953F412C126}" type="datetimeFigureOut">
               <a:rPr lang="en-US" smtClean="0"/>
-              <a:t>5/10/2022</a:t>
+              <a:t>6/11/2022</a:t>
             </a:fld>
             <a:endParaRPr lang="en-US" dirty="0"/>
           </a:p>
@@ -812,7 +812,7 @@
           <a:p>
             <a:fld id="{48A87A34-81AB-432B-8DAE-1953F412C126}" type="datetimeFigureOut">
               <a:rPr lang="en-US" smtClean="0"/>
-              <a:t>5/10/2022</a:t>
+              <a:t>6/11/2022</a:t>
             </a:fld>
             <a:endParaRPr lang="en-US" dirty="0"/>
           </a:p>
@@ -986,7 +986,7 @@
           <a:p>
             <a:fld id="{48A87A34-81AB-432B-8DAE-1953F412C126}" type="datetimeFigureOut">
               <a:rPr lang="en-US" smtClean="0"/>
-              <a:t>5/10/2022</a:t>
+              <a:t>6/11/2022</a:t>
             </a:fld>
             <a:endParaRPr lang="en-US" dirty="0"/>
           </a:p>
@@ -1329,7 +1329,7 @@
           <a:p>
             <a:fld id="{48A87A34-81AB-432B-8DAE-1953F412C126}" type="datetimeFigureOut">
               <a:rPr lang="en-US" smtClean="0"/>
-              <a:t>5/10/2022</a:t>
+              <a:t>6/11/2022</a:t>
             </a:fld>
             <a:endParaRPr lang="en-US" dirty="0"/>
           </a:p>
@@ -1604,7 +1604,7 @@
           <a:p>
             <a:fld id="{48A87A34-81AB-432B-8DAE-1953F412C126}" type="datetimeFigureOut">
               <a:rPr lang="en-US" smtClean="0"/>
-              <a:t>5/10/2022</a:t>
+              <a:t>6/11/2022</a:t>
             </a:fld>
             <a:endParaRPr lang="en-US" dirty="0"/>
           </a:p>
@@ -1983,7 +1983,7 @@
           <a:p>
             <a:fld id="{48A87A34-81AB-432B-8DAE-1953F412C126}" type="datetimeFigureOut">
               <a:rPr lang="en-US" smtClean="0"/>
-              <a:t>5/10/2022</a:t>
+              <a:t>6/11/2022</a:t>
             </a:fld>
             <a:endParaRPr lang="en-US" dirty="0"/>
           </a:p>
@@ -2101,7 +2101,7 @@
           <a:p>
             <a:fld id="{48A87A34-81AB-432B-8DAE-1953F412C126}" type="datetimeFigureOut">
               <a:rPr lang="en-US" smtClean="0"/>
-              <a:t>5/10/2022</a:t>
+              <a:t>6/11/2022</a:t>
             </a:fld>
             <a:endParaRPr lang="en-US" dirty="0"/>
           </a:p>
@@ -2272,7 +2272,7 @@
           <a:p>
             <a:fld id="{48A87A34-81AB-432B-8DAE-1953F412C126}" type="datetimeFigureOut">
               <a:rPr lang="en-US" smtClean="0"/>
-              <a:t>5/10/2022</a:t>
+              <a:t>6/11/2022</a:t>
             </a:fld>
             <a:endParaRPr lang="en-US" dirty="0"/>
           </a:p>
@@ -2626,7 +2626,7 @@
           <a:p>
             <a:fld id="{48A87A34-81AB-432B-8DAE-1953F412C126}" type="datetimeFigureOut">
               <a:rPr lang="en-US" smtClean="0"/>
-              <a:t>5/10/2022</a:t>
+              <a:t>6/11/2022</a:t>
             </a:fld>
             <a:endParaRPr lang="en-US" dirty="0"/>
           </a:p>
@@ -3008,7 +3008,7 @@
           <a:p>
             <a:fld id="{48A87A34-81AB-432B-8DAE-1953F412C126}" type="datetimeFigureOut">
               <a:rPr lang="en-US" smtClean="0"/>
-              <a:t>5/10/2022</a:t>
+              <a:t>6/11/2022</a:t>
             </a:fld>
             <a:endParaRPr lang="en-US" dirty="0"/>
           </a:p>
@@ -3296,7 +3296,7 @@
             <a:fld id="{48A87A34-81AB-432B-8DAE-1953F412C126}" type="datetimeFigureOut">
               <a:rPr lang="en-US" smtClean="0"/>
               <a:pPr/>
-              <a:t>5/10/2022</a:t>
+              <a:t>6/11/2022</a:t>
             </a:fld>
             <a:endParaRPr lang="en-US" dirty="0"/>
           </a:p>
@@ -5133,7 +5133,7 @@
         </p:blipFill>
         <p:spPr bwMode="auto">
           <a:xfrm>
-            <a:off x="3527316" y="1407919"/>
+            <a:off x="2114093" y="1390164"/>
             <a:ext cx="4763589" cy="1332316"/>
           </a:xfrm>
           <a:prstGeom prst="rect">
@@ -5188,6 +5188,53 @@
           <a:ln>
             <a:noFill/>
           </a:ln>
+        </p:spPr>
+      </p:pic>
+      <p:pic>
+        <p:nvPicPr>
+          <p:cNvPr id="1026" name="Picture 2" descr="GitHub скачать бесплатно - Последняя версия 2022">
+            <a:extLst>
+              <a:ext uri="{FF2B5EF4-FFF2-40B4-BE49-F238E27FC236}">
+                <a16:creationId xmlns:a16="http://schemas.microsoft.com/office/drawing/2014/main" id="{211838DC-A385-4455-A6DB-48EB69073352}"/>
+              </a:ext>
+            </a:extLst>
+          </p:cNvPr>
+          <p:cNvPicPr>
+            <a:picLocks noChangeAspect="1" noChangeArrowheads="1"/>
+          </p:cNvPicPr>
+          <p:nvPr/>
+        </p:nvPicPr>
+        <p:blipFill>
+          <a:blip r:embed="rId4">
+            <a:extLst>
+              <a:ext uri="{28A0092B-C50C-407E-A947-70E740481C1C}">
+                <a14:useLocalDpi xmlns:a14="http://schemas.microsoft.com/office/drawing/2010/main" val="0"/>
+              </a:ext>
+            </a:extLst>
+          </a:blip>
+          <a:srcRect/>
+          <a:stretch>
+            <a:fillRect/>
+          </a:stretch>
+        </p:blipFill>
+        <p:spPr bwMode="auto">
+          <a:xfrm>
+            <a:off x="7126335" y="894378"/>
+            <a:ext cx="3621095" cy="2036866"/>
+          </a:xfrm>
+          <a:prstGeom prst="rect">
+            <a:avLst/>
+          </a:prstGeom>
+          <a:noFill/>
+          <a:extLst>
+            <a:ext uri="{909E8E84-426E-40DD-AFC4-6F175D3DCCD1}">
+              <a14:hiddenFill xmlns:a14="http://schemas.microsoft.com/office/drawing/2010/main">
+                <a:solidFill>
+                  <a:srgbClr val="FFFFFF"/>
+                </a:solidFill>
+              </a14:hiddenFill>
+            </a:ext>
+          </a:extLst>
         </p:spPr>
       </p:pic>
     </p:spTree>

</xml_diff>